<commit_message>
renamed BAG QA to BAG Checks + icon + fixed removal bug
</commit_message>
<xml_diff>
--- a/resources/icons.pptx
+++ b/resources/icons.pptx
@@ -5,7 +5,7 @@
     <p:sldMasterId id="2147483684" r:id="rId1"/>
   </p:sldMasterIdLst>
   <p:notesMasterIdLst>
-    <p:notesMasterId r:id="rId25"/>
+    <p:notesMasterId r:id="rId26"/>
   </p:notesMasterIdLst>
   <p:sldIdLst>
     <p:sldId id="388" r:id="rId2"/>
@@ -16,21 +16,22 @@
     <p:sldId id="595" r:id="rId7"/>
     <p:sldId id="577" r:id="rId8"/>
     <p:sldId id="578" r:id="rId9"/>
-    <p:sldId id="579" r:id="rId10"/>
-    <p:sldId id="580" r:id="rId11"/>
-    <p:sldId id="581" r:id="rId12"/>
-    <p:sldId id="582" r:id="rId13"/>
-    <p:sldId id="583" r:id="rId14"/>
-    <p:sldId id="586" r:id="rId15"/>
-    <p:sldId id="584" r:id="rId16"/>
-    <p:sldId id="585" r:id="rId17"/>
-    <p:sldId id="588" r:id="rId18"/>
-    <p:sldId id="589" r:id="rId19"/>
-    <p:sldId id="590" r:id="rId20"/>
-    <p:sldId id="591" r:id="rId21"/>
-    <p:sldId id="592" r:id="rId22"/>
-    <p:sldId id="594" r:id="rId23"/>
-    <p:sldId id="593" r:id="rId24"/>
+    <p:sldId id="596" r:id="rId10"/>
+    <p:sldId id="579" r:id="rId11"/>
+    <p:sldId id="580" r:id="rId12"/>
+    <p:sldId id="581" r:id="rId13"/>
+    <p:sldId id="582" r:id="rId14"/>
+    <p:sldId id="583" r:id="rId15"/>
+    <p:sldId id="586" r:id="rId16"/>
+    <p:sldId id="584" r:id="rId17"/>
+    <p:sldId id="585" r:id="rId18"/>
+    <p:sldId id="588" r:id="rId19"/>
+    <p:sldId id="589" r:id="rId20"/>
+    <p:sldId id="590" r:id="rId21"/>
+    <p:sldId id="591" r:id="rId22"/>
+    <p:sldId id="592" r:id="rId23"/>
+    <p:sldId id="594" r:id="rId24"/>
+    <p:sldId id="593" r:id="rId25"/>
   </p:sldIdLst>
   <p:sldSz cx="914400" cy="914400"/>
   <p:notesSz cx="6858000" cy="9144000"/>
@@ -219,7 +220,7 @@
           <a:p>
             <a:fld id="{173FD435-C119-4590-9D53-7CAF83F19020}" type="datetimeFigureOut">
               <a:rPr lang="en-US" smtClean="0"/>
-              <a:t>7/3/2019</a:t>
+              <a:t>1/2/2021</a:t>
             </a:fld>
             <a:endParaRPr lang="en-US"/>
           </a:p>
@@ -617,7 +618,7 @@
           <a:p>
             <a:fld id="{D296FE55-24A0-4405-87BA-F203EB2AA989}" type="datetimeFigureOut">
               <a:rPr lang="en-US" smtClean="0"/>
-              <a:t>7/3/2019</a:t>
+              <a:t>1/2/2021</a:t>
             </a:fld>
             <a:endParaRPr lang="en-US"/>
           </a:p>
@@ -787,7 +788,7 @@
           <a:p>
             <a:fld id="{D296FE55-24A0-4405-87BA-F203EB2AA989}" type="datetimeFigureOut">
               <a:rPr lang="en-US" smtClean="0"/>
-              <a:t>7/3/2019</a:t>
+              <a:t>1/2/2021</a:t>
             </a:fld>
             <a:endParaRPr lang="en-US"/>
           </a:p>
@@ -967,7 +968,7 @@
           <a:p>
             <a:fld id="{D296FE55-24A0-4405-87BA-F203EB2AA989}" type="datetimeFigureOut">
               <a:rPr lang="en-US" smtClean="0"/>
-              <a:t>7/3/2019</a:t>
+              <a:t>1/2/2021</a:t>
             </a:fld>
             <a:endParaRPr lang="en-US"/>
           </a:p>
@@ -1137,7 +1138,7 @@
           <a:p>
             <a:fld id="{D296FE55-24A0-4405-87BA-F203EB2AA989}" type="datetimeFigureOut">
               <a:rPr lang="en-US" smtClean="0"/>
-              <a:t>7/3/2019</a:t>
+              <a:t>1/2/2021</a:t>
             </a:fld>
             <a:endParaRPr lang="en-US"/>
           </a:p>
@@ -1381,7 +1382,7 @@
           <a:p>
             <a:fld id="{D296FE55-24A0-4405-87BA-F203EB2AA989}" type="datetimeFigureOut">
               <a:rPr lang="en-US" smtClean="0"/>
-              <a:t>7/3/2019</a:t>
+              <a:t>1/2/2021</a:t>
             </a:fld>
             <a:endParaRPr lang="en-US"/>
           </a:p>
@@ -1613,7 +1614,7 @@
           <a:p>
             <a:fld id="{D296FE55-24A0-4405-87BA-F203EB2AA989}" type="datetimeFigureOut">
               <a:rPr lang="en-US" smtClean="0"/>
-              <a:t>7/3/2019</a:t>
+              <a:t>1/2/2021</a:t>
             </a:fld>
             <a:endParaRPr lang="en-US"/>
           </a:p>
@@ -1980,7 +1981,7 @@
           <a:p>
             <a:fld id="{D296FE55-24A0-4405-87BA-F203EB2AA989}" type="datetimeFigureOut">
               <a:rPr lang="en-US" smtClean="0"/>
-              <a:t>7/3/2019</a:t>
+              <a:t>1/2/2021</a:t>
             </a:fld>
             <a:endParaRPr lang="en-US"/>
           </a:p>
@@ -2098,7 +2099,7 @@
           <a:p>
             <a:fld id="{D296FE55-24A0-4405-87BA-F203EB2AA989}" type="datetimeFigureOut">
               <a:rPr lang="en-US" smtClean="0"/>
-              <a:t>7/3/2019</a:t>
+              <a:t>1/2/2021</a:t>
             </a:fld>
             <a:endParaRPr lang="en-US"/>
           </a:p>
@@ -2193,7 +2194,7 @@
           <a:p>
             <a:fld id="{D296FE55-24A0-4405-87BA-F203EB2AA989}" type="datetimeFigureOut">
               <a:rPr lang="en-US" smtClean="0"/>
-              <a:t>7/3/2019</a:t>
+              <a:t>1/2/2021</a:t>
             </a:fld>
             <a:endParaRPr lang="en-US"/>
           </a:p>
@@ -2470,7 +2471,7 @@
           <a:p>
             <a:fld id="{D296FE55-24A0-4405-87BA-F203EB2AA989}" type="datetimeFigureOut">
               <a:rPr lang="en-US" smtClean="0"/>
-              <a:t>7/3/2019</a:t>
+              <a:t>1/2/2021</a:t>
             </a:fld>
             <a:endParaRPr lang="en-US"/>
           </a:p>
@@ -2727,7 +2728,7 @@
           <a:p>
             <a:fld id="{D296FE55-24A0-4405-87BA-F203EB2AA989}" type="datetimeFigureOut">
               <a:rPr lang="en-US" smtClean="0"/>
-              <a:t>7/3/2019</a:t>
+              <a:t>1/2/2021</a:t>
             </a:fld>
             <a:endParaRPr lang="en-US"/>
           </a:p>
@@ -2940,7 +2941,7 @@
           <a:p>
             <a:fld id="{D296FE55-24A0-4405-87BA-F203EB2AA989}" type="datetimeFigureOut">
               <a:rPr lang="en-US" smtClean="0"/>
-              <a:t>7/3/2019</a:t>
+              <a:t>1/2/2021</a:t>
             </a:fld>
             <a:endParaRPr lang="en-US"/>
           </a:p>
@@ -3471,6 +3472,115 @@
           <p:cNvPr id="2" name="Picture 1">
             <a:extLst>
               <a:ext uri="{FF2B5EF4-FFF2-40B4-BE49-F238E27FC236}">
+                <a16:creationId xmlns:a16="http://schemas.microsoft.com/office/drawing/2014/main" id="{18D1E2EE-8D1A-46A8-9B72-AA671E882303}"/>
+              </a:ext>
+            </a:extLst>
+          </p:cNvPr>
+          <p:cNvPicPr>
+            <a:picLocks noChangeAspect="1"/>
+          </p:cNvPicPr>
+          <p:nvPr/>
+        </p:nvPicPr>
+        <p:blipFill>
+          <a:blip r:embed="rId2" cstate="print">
+            <a:duotone>
+              <a:prstClr val="black"/>
+              <a:schemeClr val="accent4">
+                <a:tint val="45000"/>
+                <a:satMod val="400000"/>
+              </a:schemeClr>
+            </a:duotone>
+            <a:extLst>
+              <a:ext uri="{28A0092B-C50C-407E-A947-70E740481C1C}">
+                <a14:useLocalDpi xmlns:a14="http://schemas.microsoft.com/office/drawing/2010/main" val="0"/>
+              </a:ext>
+            </a:extLst>
+          </a:blip>
+          <a:stretch>
+            <a:fillRect/>
+          </a:stretch>
+        </p:blipFill>
+        <p:spPr>
+          <a:xfrm>
+            <a:off x="306230" y="128588"/>
+            <a:ext cx="595314" cy="595314"/>
+          </a:xfrm>
+          <a:prstGeom prst="rect">
+            <a:avLst/>
+          </a:prstGeom>
+        </p:spPr>
+      </p:pic>
+      <p:pic>
+        <p:nvPicPr>
+          <p:cNvPr id="3" name="Picture 2">
+            <a:extLst>
+              <a:ext uri="{FF2B5EF4-FFF2-40B4-BE49-F238E27FC236}">
+                <a16:creationId xmlns:a16="http://schemas.microsoft.com/office/drawing/2014/main" id="{2E47435F-0976-4F6D-8050-2BA65A01CEBA}"/>
+              </a:ext>
+            </a:extLst>
+          </p:cNvPr>
+          <p:cNvPicPr>
+            <a:picLocks noChangeAspect="1"/>
+          </p:cNvPicPr>
+          <p:nvPr/>
+        </p:nvPicPr>
+        <p:blipFill>
+          <a:blip r:embed="rId3" cstate="print">
+            <a:extLst>
+              <a:ext uri="{28A0092B-C50C-407E-A947-70E740481C1C}">
+                <a14:useLocalDpi xmlns:a14="http://schemas.microsoft.com/office/drawing/2010/main" val="0"/>
+              </a:ext>
+            </a:extLst>
+          </a:blip>
+          <a:stretch>
+            <a:fillRect/>
+          </a:stretch>
+        </p:blipFill>
+        <p:spPr>
+          <a:xfrm rot="21361804" flipH="1">
+            <a:off x="-8934" y="184976"/>
+            <a:ext cx="642429" cy="597714"/>
+          </a:xfrm>
+          <a:prstGeom prst="rect">
+            <a:avLst/>
+          </a:prstGeom>
+        </p:spPr>
+      </p:pic>
+    </p:spTree>
+    <p:extLst>
+      <p:ext uri="{BB962C8B-B14F-4D97-AF65-F5344CB8AC3E}">
+        <p14:creationId xmlns:p14="http://schemas.microsoft.com/office/powerpoint/2010/main" val="1389446329"/>
+      </p:ext>
+    </p:extLst>
+  </p:cSld>
+  <p:clrMapOvr>
+    <a:masterClrMapping/>
+  </p:clrMapOvr>
+</p:sld>
+</file>
+
+<file path=ppt/slides/slide11.xml><?xml version="1.0" encoding="utf-8"?>
+<p:sld xmlns:a="http://schemas.openxmlformats.org/drawingml/2006/main" xmlns:r="http://schemas.openxmlformats.org/officeDocument/2006/relationships" xmlns:p="http://schemas.openxmlformats.org/presentationml/2006/main">
+  <p:cSld>
+    <p:spTree>
+      <p:nvGrpSpPr>
+        <p:cNvPr id="1" name=""/>
+        <p:cNvGrpSpPr/>
+        <p:nvPr/>
+      </p:nvGrpSpPr>
+      <p:grpSpPr>
+        <a:xfrm>
+          <a:off x="0" y="0"/>
+          <a:ext cx="0" cy="0"/>
+          <a:chOff x="0" y="0"/>
+          <a:chExt cx="0" cy="0"/>
+        </a:xfrm>
+      </p:grpSpPr>
+      <p:pic>
+        <p:nvPicPr>
+          <p:cNvPr id="2" name="Picture 1">
+            <a:extLst>
+              <a:ext uri="{FF2B5EF4-FFF2-40B4-BE49-F238E27FC236}">
                 <a16:creationId xmlns:a16="http://schemas.microsoft.com/office/drawing/2014/main" id="{96E44A05-E073-4EBA-B9BD-0B3293A32199}"/>
               </a:ext>
             </a:extLst>
@@ -3545,7 +3655,7 @@
 </p:sld>
 </file>
 
-<file path=ppt/slides/slide11.xml><?xml version="1.0" encoding="utf-8"?>
+<file path=ppt/slides/slide12.xml><?xml version="1.0" encoding="utf-8"?>
 <p:sld xmlns:a="http://schemas.openxmlformats.org/drawingml/2006/main" xmlns:r="http://schemas.openxmlformats.org/officeDocument/2006/relationships" xmlns:p="http://schemas.openxmlformats.org/presentationml/2006/main">
   <p:cSld>
     <p:spTree>
@@ -9136,7 +9246,7 @@
 </p:sld>
 </file>
 
-<file path=ppt/slides/slide12.xml><?xml version="1.0" encoding="utf-8"?>
+<file path=ppt/slides/slide13.xml><?xml version="1.0" encoding="utf-8"?>
 <p:sld xmlns:a="http://schemas.openxmlformats.org/drawingml/2006/main" xmlns:r="http://schemas.openxmlformats.org/officeDocument/2006/relationships" xmlns:p="http://schemas.openxmlformats.org/presentationml/2006/main">
   <p:cSld>
     <p:spTree>
@@ -9309,7 +9419,7 @@
 </p:sld>
 </file>
 
-<file path=ppt/slides/slide13.xml><?xml version="1.0" encoding="utf-8"?>
+<file path=ppt/slides/slide14.xml><?xml version="1.0" encoding="utf-8"?>
 <p:sld xmlns:a="http://schemas.openxmlformats.org/drawingml/2006/main" xmlns:r="http://schemas.openxmlformats.org/officeDocument/2006/relationships" xmlns:p="http://schemas.openxmlformats.org/presentationml/2006/main">
   <p:cSld>
     <p:spTree>
@@ -9474,7 +9584,7 @@
 </p:sld>
 </file>
 
-<file path=ppt/slides/slide14.xml><?xml version="1.0" encoding="utf-8"?>
+<file path=ppt/slides/slide15.xml><?xml version="1.0" encoding="utf-8"?>
 <p:sld xmlns:a="http://schemas.openxmlformats.org/drawingml/2006/main" xmlns:r="http://schemas.openxmlformats.org/officeDocument/2006/relationships" xmlns:p="http://schemas.openxmlformats.org/presentationml/2006/main">
   <p:cSld>
     <p:spTree>
@@ -9504,7 +9614,7 @@
 </p:sld>
 </file>
 
-<file path=ppt/slides/slide15.xml><?xml version="1.0" encoding="utf-8"?>
+<file path=ppt/slides/slide16.xml><?xml version="1.0" encoding="utf-8"?>
 <p:sld xmlns:a="http://schemas.openxmlformats.org/drawingml/2006/main" xmlns:r="http://schemas.openxmlformats.org/officeDocument/2006/relationships" xmlns:p="http://schemas.openxmlformats.org/presentationml/2006/main">
   <p:cSld>
     <p:spTree>
@@ -9667,7 +9777,7 @@
 </p:sld>
 </file>
 
-<file path=ppt/slides/slide16.xml><?xml version="1.0" encoding="utf-8"?>
+<file path=ppt/slides/slide17.xml><?xml version="1.0" encoding="utf-8"?>
 <p:sld xmlns:a="http://schemas.openxmlformats.org/drawingml/2006/main" xmlns:r="http://schemas.openxmlformats.org/officeDocument/2006/relationships" xmlns:p="http://schemas.openxmlformats.org/presentationml/2006/main">
   <p:cSld>
     <p:spTree>
@@ -9775,7 +9885,7 @@
 </p:sld>
 </file>
 
-<file path=ppt/slides/slide17.xml><?xml version="1.0" encoding="utf-8"?>
+<file path=ppt/slides/slide18.xml><?xml version="1.0" encoding="utf-8"?>
 <p:sld xmlns:a="http://schemas.openxmlformats.org/drawingml/2006/main" xmlns:r="http://schemas.openxmlformats.org/officeDocument/2006/relationships" xmlns:p="http://schemas.openxmlformats.org/presentationml/2006/main">
   <p:cSld>
     <p:spTree>
@@ -10109,7 +10219,7 @@
 </p:sld>
 </file>
 
-<file path=ppt/slides/slide18.xml><?xml version="1.0" encoding="utf-8"?>
+<file path=ppt/slides/slide19.xml><?xml version="1.0" encoding="utf-8"?>
 <p:sld xmlns:a="http://schemas.openxmlformats.org/drawingml/2006/main" xmlns:r="http://schemas.openxmlformats.org/officeDocument/2006/relationships" xmlns:p="http://schemas.openxmlformats.org/presentationml/2006/main">
   <p:cSld>
     <p:spTree>
@@ -10709,36 +10819,6 @@
 </p:sld>
 </file>
 
-<file path=ppt/slides/slide19.xml><?xml version="1.0" encoding="utf-8"?>
-<p:sld xmlns:a="http://schemas.openxmlformats.org/drawingml/2006/main" xmlns:r="http://schemas.openxmlformats.org/officeDocument/2006/relationships" xmlns:p="http://schemas.openxmlformats.org/presentationml/2006/main">
-  <p:cSld>
-    <p:spTree>
-      <p:nvGrpSpPr>
-        <p:cNvPr id="1" name=""/>
-        <p:cNvGrpSpPr/>
-        <p:nvPr/>
-      </p:nvGrpSpPr>
-      <p:grpSpPr>
-        <a:xfrm>
-          <a:off x="0" y="0"/>
-          <a:ext cx="0" cy="0"/>
-          <a:chOff x="0" y="0"/>
-          <a:chExt cx="0" cy="0"/>
-        </a:xfrm>
-      </p:grpSpPr>
-    </p:spTree>
-    <p:extLst>
-      <p:ext uri="{BB962C8B-B14F-4D97-AF65-F5344CB8AC3E}">
-        <p14:creationId xmlns:p14="http://schemas.microsoft.com/office/powerpoint/2010/main" val="2650304348"/>
-      </p:ext>
-    </p:extLst>
-  </p:cSld>
-  <p:clrMapOvr>
-    <a:masterClrMapping/>
-  </p:clrMapOvr>
-</p:sld>
-</file>
-
 <file path=ppt/slides/slide2.xml><?xml version="1.0" encoding="utf-8"?>
 <p:sld xmlns:a="http://schemas.openxmlformats.org/drawingml/2006/main" xmlns:r="http://schemas.openxmlformats.org/officeDocument/2006/relationships" xmlns:p="http://schemas.openxmlformats.org/presentationml/2006/main">
   <p:cSld>
@@ -10852,6 +10932,36 @@
 </file>
 
 <file path=ppt/slides/slide20.xml><?xml version="1.0" encoding="utf-8"?>
+<p:sld xmlns:a="http://schemas.openxmlformats.org/drawingml/2006/main" xmlns:r="http://schemas.openxmlformats.org/officeDocument/2006/relationships" xmlns:p="http://schemas.openxmlformats.org/presentationml/2006/main">
+  <p:cSld>
+    <p:spTree>
+      <p:nvGrpSpPr>
+        <p:cNvPr id="1" name=""/>
+        <p:cNvGrpSpPr/>
+        <p:nvPr/>
+      </p:nvGrpSpPr>
+      <p:grpSpPr>
+        <a:xfrm>
+          <a:off x="0" y="0"/>
+          <a:ext cx="0" cy="0"/>
+          <a:chOff x="0" y="0"/>
+          <a:chExt cx="0" cy="0"/>
+        </a:xfrm>
+      </p:grpSpPr>
+    </p:spTree>
+    <p:extLst>
+      <p:ext uri="{BB962C8B-B14F-4D97-AF65-F5344CB8AC3E}">
+        <p14:creationId xmlns:p14="http://schemas.microsoft.com/office/powerpoint/2010/main" val="2650304348"/>
+      </p:ext>
+    </p:extLst>
+  </p:cSld>
+  <p:clrMapOvr>
+    <a:masterClrMapping/>
+  </p:clrMapOvr>
+</p:sld>
+</file>
+
+<file path=ppt/slides/slide21.xml><?xml version="1.0" encoding="utf-8"?>
 <p:sld xmlns:a="http://schemas.openxmlformats.org/drawingml/2006/main" xmlns:r="http://schemas.openxmlformats.org/officeDocument/2006/relationships" xmlns:p="http://schemas.openxmlformats.org/presentationml/2006/main">
   <p:cSld>
     <p:spTree>
@@ -11624,7 +11734,7 @@
 </p:sld>
 </file>
 
-<file path=ppt/slides/slide21.xml><?xml version="1.0" encoding="utf-8"?>
+<file path=ppt/slides/slide22.xml><?xml version="1.0" encoding="utf-8"?>
 <p:sld xmlns:a="http://schemas.openxmlformats.org/drawingml/2006/main" xmlns:r="http://schemas.openxmlformats.org/officeDocument/2006/relationships" xmlns:p="http://schemas.openxmlformats.org/presentationml/2006/main">
   <p:cSld>
     <p:spTree>
@@ -11690,7 +11800,7 @@
 </p:sld>
 </file>
 
-<file path=ppt/slides/slide22.xml><?xml version="1.0" encoding="utf-8"?>
+<file path=ppt/slides/slide23.xml><?xml version="1.0" encoding="utf-8"?>
 <p:sld xmlns:a="http://schemas.openxmlformats.org/drawingml/2006/main" xmlns:r="http://schemas.openxmlformats.org/officeDocument/2006/relationships" xmlns:p="http://schemas.openxmlformats.org/presentationml/2006/main">
   <p:cSld>
     <p:spTree>
@@ -12881,7 +12991,7 @@
 </p:sld>
 </file>
 
-<file path=ppt/slides/slide23.xml><?xml version="1.0" encoding="utf-8"?>
+<file path=ppt/slides/slide24.xml><?xml version="1.0" encoding="utf-8"?>
 <p:sld xmlns:a="http://schemas.openxmlformats.org/drawingml/2006/main" xmlns:r="http://schemas.openxmlformats.org/officeDocument/2006/relationships" xmlns:p="http://schemas.openxmlformats.org/presentationml/2006/main">
   <p:cSld>
     <p:spTree>
@@ -24589,89 +24699,279 @@
           <a:chExt cx="0" cy="0"/>
         </a:xfrm>
       </p:grpSpPr>
-      <p:pic>
-        <p:nvPicPr>
-          <p:cNvPr id="2" name="Picture 1">
+      <p:sp>
+        <p:nvSpPr>
+          <p:cNvPr id="3" name="TextBox 2">
             <a:extLst>
               <a:ext uri="{FF2B5EF4-FFF2-40B4-BE49-F238E27FC236}">
-                <a16:creationId xmlns:a16="http://schemas.microsoft.com/office/drawing/2014/main" id="{18D1E2EE-8D1A-46A8-9B72-AA671E882303}"/>
+                <a16:creationId xmlns:a16="http://schemas.microsoft.com/office/drawing/2014/main" id="{F7E09E6A-3B7C-45F4-95DB-63FBA56CDB62}"/>
               </a:ext>
             </a:extLst>
           </p:cNvPr>
-          <p:cNvPicPr>
-            <a:picLocks noChangeAspect="1"/>
-          </p:cNvPicPr>
+          <p:cNvSpPr txBox="1"/>
           <p:nvPr/>
-        </p:nvPicPr>
-        <p:blipFill>
-          <a:blip r:embed="rId2" cstate="print">
-            <a:duotone>
-              <a:prstClr val="black"/>
-              <a:schemeClr val="accent4">
-                <a:tint val="45000"/>
-                <a:satMod val="400000"/>
-              </a:schemeClr>
-            </a:duotone>
-            <a:extLst>
-              <a:ext uri="{28A0092B-C50C-407E-A947-70E740481C1C}">
-                <a14:useLocalDpi xmlns:a14="http://schemas.microsoft.com/office/drawing/2010/main" val="0"/>
-              </a:ext>
-            </a:extLst>
-          </a:blip>
-          <a:stretch>
-            <a:fillRect/>
-          </a:stretch>
-        </p:blipFill>
+        </p:nvSpPr>
         <p:spPr>
           <a:xfrm>
-            <a:off x="306230" y="128588"/>
-            <a:ext cx="595314" cy="595314"/>
+            <a:off x="0" y="2381"/>
+            <a:ext cx="1054896" cy="1007776"/>
           </a:xfrm>
           <a:prstGeom prst="rect">
             <a:avLst/>
           </a:prstGeom>
+          <a:noFill/>
+          <a:effectLst/>
         </p:spPr>
-      </p:pic>
-      <p:pic>
-        <p:nvPicPr>
-          <p:cNvPr id="3" name="Picture 2">
+        <p:txBody>
+          <a:bodyPr wrap="square" rtlCol="0">
+            <a:spAutoFit/>
+            <a:scene3d>
+              <a:camera prst="orthographicFront"/>
+              <a:lightRig rig="soft" dir="t">
+                <a:rot lat="0" lon="0" rev="16200000"/>
+              </a:lightRig>
+            </a:scene3d>
+            <a:sp3d extrusionH="63500" prstMaterial="softEdge"/>
+          </a:bodyPr>
+          <a:lstStyle/>
+          <a:p>
+            <a:pPr>
+              <a:lnSpc>
+                <a:spcPct val="70000"/>
+              </a:lnSpc>
+            </a:pPr>
+            <a:r>
+              <a:rPr lang="en-US" sz="2800" dirty="0" smtClean="0">
+                <a:ln/>
+                <a:solidFill>
+                  <a:schemeClr val="accent1">
+                    <a:lumMod val="75000"/>
+                  </a:schemeClr>
+                </a:solidFill>
+                <a:latin typeface="Cooper Black" panose="0208090404030B020404" pitchFamily="18" charset="0"/>
+                <a:cs typeface="Gautami" panose="020B0502040204020203" pitchFamily="34" charset="0"/>
+              </a:rPr>
+              <a:t>B </a:t>
+            </a:r>
+          </a:p>
+          <a:p>
+            <a:pPr>
+              <a:lnSpc>
+                <a:spcPct val="70000"/>
+              </a:lnSpc>
+            </a:pPr>
+            <a:r>
+              <a:rPr lang="en-US" sz="2800" dirty="0" smtClean="0">
+                <a:ln/>
+                <a:solidFill>
+                  <a:schemeClr val="accent1">
+                    <a:lumMod val="75000"/>
+                  </a:schemeClr>
+                </a:solidFill>
+                <a:latin typeface="Cooper Black" panose="0208090404030B020404" pitchFamily="18" charset="0"/>
+                <a:cs typeface="Gautami" panose="020B0502040204020203" pitchFamily="34" charset="0"/>
+              </a:rPr>
+              <a:t>A</a:t>
+            </a:r>
+          </a:p>
+          <a:p>
+            <a:pPr>
+              <a:lnSpc>
+                <a:spcPct val="70000"/>
+              </a:lnSpc>
+            </a:pPr>
+            <a:r>
+              <a:rPr lang="en-US" sz="2800" dirty="0" smtClean="0">
+                <a:ln/>
+                <a:solidFill>
+                  <a:schemeClr val="accent1">
+                    <a:lumMod val="75000"/>
+                  </a:schemeClr>
+                </a:solidFill>
+                <a:latin typeface="Cooper Black" panose="0208090404030B020404" pitchFamily="18" charset="0"/>
+                <a:cs typeface="Gautami" panose="020B0502040204020203" pitchFamily="34" charset="0"/>
+              </a:rPr>
+              <a:t>G</a:t>
+            </a:r>
+            <a:endParaRPr lang="en-US" sz="2800" dirty="0">
+              <a:ln/>
+              <a:solidFill>
+                <a:schemeClr val="accent1">
+                  <a:lumMod val="75000"/>
+                </a:schemeClr>
+              </a:solidFill>
+              <a:latin typeface="Cooper Black" panose="0208090404030B020404" pitchFamily="18" charset="0"/>
+              <a:cs typeface="Gautami" panose="020B0502040204020203" pitchFamily="34" charset="0"/>
+            </a:endParaRPr>
+          </a:p>
+        </p:txBody>
+      </p:sp>
+      <p:sp>
+        <p:nvSpPr>
+          <p:cNvPr id="18" name="TextBox 17">
             <a:extLst>
               <a:ext uri="{FF2B5EF4-FFF2-40B4-BE49-F238E27FC236}">
-                <a16:creationId xmlns:a16="http://schemas.microsoft.com/office/drawing/2014/main" id="{2E47435F-0976-4F6D-8050-2BA65A01CEBA}"/>
+                <a16:creationId xmlns:a16="http://schemas.microsoft.com/office/drawing/2014/main" id="{8F4E1C3B-E8CE-4613-B2ED-340AD417FF68}"/>
               </a:ext>
             </a:extLst>
           </p:cNvPr>
-          <p:cNvPicPr>
-            <a:picLocks noChangeAspect="1"/>
-          </p:cNvPicPr>
+          <p:cNvSpPr txBox="1"/>
           <p:nvPr/>
-        </p:nvPicPr>
-        <p:blipFill>
-          <a:blip r:embed="rId3" cstate="print">
-            <a:extLst>
-              <a:ext uri="{28A0092B-C50C-407E-A947-70E740481C1C}">
-                <a14:useLocalDpi xmlns:a14="http://schemas.microsoft.com/office/drawing/2010/main" val="0"/>
-              </a:ext>
-            </a:extLst>
-          </a:blip>
-          <a:stretch>
-            <a:fillRect/>
-          </a:stretch>
-        </p:blipFill>
+        </p:nvSpPr>
         <p:spPr>
-          <a:xfrm rot="21361804" flipH="1">
-            <a:off x="-8934" y="184976"/>
-            <a:ext cx="642429" cy="597714"/>
+          <a:xfrm>
+            <a:off x="388147" y="-28749"/>
+            <a:ext cx="385347" cy="923330"/>
           </a:xfrm>
           <a:prstGeom prst="rect">
             <a:avLst/>
           </a:prstGeom>
+          <a:noFill/>
+          <a:ln>
+            <a:noFill/>
+          </a:ln>
         </p:spPr>
-      </p:pic>
+        <p:txBody>
+          <a:bodyPr wrap="square" rtlCol="0">
+            <a:spAutoFit/>
+            <a:scene3d>
+              <a:camera prst="orthographicFront"/>
+              <a:lightRig rig="threePt" dir="t"/>
+            </a:scene3d>
+            <a:sp3d extrusionH="31750">
+              <a:bevelT w="25400" h="25400" prst="angle"/>
+            </a:sp3d>
+          </a:bodyPr>
+          <a:lstStyle/>
+          <a:p>
+            <a:r>
+              <a:rPr lang="en-US" dirty="0" smtClean="0">
+                <a:gradFill flip="none" rotWithShape="1">
+                  <a:gsLst>
+                    <a:gs pos="0">
+                      <a:schemeClr val="accent6">
+                        <a:lumMod val="85000"/>
+                      </a:schemeClr>
+                    </a:gs>
+                    <a:gs pos="23000">
+                      <a:schemeClr val="accent6">
+                        <a:lumMod val="80000"/>
+                      </a:schemeClr>
+                    </a:gs>
+                    <a:gs pos="69000">
+                      <a:schemeClr val="accent6">
+                        <a:lumMod val="65000"/>
+                      </a:schemeClr>
+                    </a:gs>
+                    <a:gs pos="97000">
+                      <a:schemeClr val="accent6">
+                        <a:lumMod val="50000"/>
+                      </a:schemeClr>
+                    </a:gs>
+                  </a:gsLst>
+                  <a:path path="circle">
+                    <a:fillToRect l="50000" t="50000" r="50000" b="50000"/>
+                  </a:path>
+                  <a:tileRect/>
+                </a:gradFill>
+                <a:effectLst>
+                  <a:outerShdw blurRad="12700" dist="12700" dir="2700000" algn="tl" rotWithShape="0">
+                    <a:prstClr val="black">
+                      <a:alpha val="40000"/>
+                    </a:prstClr>
+                  </a:outerShdw>
+                </a:effectLst>
+              </a:rPr>
+              <a:t>✔    ✔ ✔</a:t>
+            </a:r>
+          </a:p>
+        </p:txBody>
+      </p:sp>
+      <p:sp>
+        <p:nvSpPr>
+          <p:cNvPr id="21" name="TextBox 20">
+            <a:extLst>
+              <a:ext uri="{FF2B5EF4-FFF2-40B4-BE49-F238E27FC236}">
+                <a16:creationId xmlns:a16="http://schemas.microsoft.com/office/drawing/2014/main" id="{8F4E1C3B-E8CE-4613-B2ED-340AD417FF68}"/>
+              </a:ext>
+            </a:extLst>
+          </p:cNvPr>
+          <p:cNvSpPr txBox="1"/>
+          <p:nvPr/>
+        </p:nvSpPr>
+        <p:spPr>
+          <a:xfrm>
+            <a:off x="580820" y="19695"/>
+            <a:ext cx="385347" cy="923330"/>
+          </a:xfrm>
+          <a:prstGeom prst="rect">
+            <a:avLst/>
+          </a:prstGeom>
+          <a:noFill/>
+          <a:ln>
+            <a:noFill/>
+          </a:ln>
+        </p:spPr>
+        <p:txBody>
+          <a:bodyPr wrap="square" rtlCol="0">
+            <a:spAutoFit/>
+            <a:scene3d>
+              <a:camera prst="orthographicFront"/>
+              <a:lightRig rig="threePt" dir="t"/>
+            </a:scene3d>
+            <a:sp3d extrusionH="31750">
+              <a:bevelT w="25400" h="25400" prst="angle"/>
+            </a:sp3d>
+          </a:bodyPr>
+          <a:lstStyle/>
+          <a:p>
+            <a:r>
+              <a:rPr lang="en-US" dirty="0" smtClean="0">
+                <a:gradFill flip="none" rotWithShape="1">
+                  <a:gsLst>
+                    <a:gs pos="0">
+                      <a:schemeClr val="accent6">
+                        <a:lumMod val="85000"/>
+                      </a:schemeClr>
+                    </a:gs>
+                    <a:gs pos="23000">
+                      <a:schemeClr val="accent6">
+                        <a:lumMod val="80000"/>
+                      </a:schemeClr>
+                    </a:gs>
+                    <a:gs pos="69000">
+                      <a:schemeClr val="accent6">
+                        <a:lumMod val="65000"/>
+                      </a:schemeClr>
+                    </a:gs>
+                    <a:gs pos="97000">
+                      <a:schemeClr val="accent6">
+                        <a:lumMod val="50000"/>
+                      </a:schemeClr>
+                    </a:gs>
+                  </a:gsLst>
+                  <a:path path="circle">
+                    <a:fillToRect l="50000" t="50000" r="50000" b="50000"/>
+                  </a:path>
+                  <a:tileRect/>
+                </a:gradFill>
+                <a:effectLst>
+                  <a:outerShdw blurRad="12700" dist="12700" dir="2700000" algn="tl" rotWithShape="0">
+                    <a:prstClr val="black">
+                      <a:alpha val="40000"/>
+                    </a:prstClr>
+                  </a:outerShdw>
+                </a:effectLst>
+              </a:rPr>
+              <a:t>✔    ✔ ✔</a:t>
+            </a:r>
+          </a:p>
+        </p:txBody>
+      </p:sp>
     </p:spTree>
     <p:extLst>
       <p:ext uri="{BB962C8B-B14F-4D97-AF65-F5344CB8AC3E}">
-        <p14:creationId xmlns:p14="http://schemas.microsoft.com/office/powerpoint/2010/main" val="1389446329"/>
+        <p14:creationId xmlns:p14="http://schemas.microsoft.com/office/powerpoint/2010/main" val="4174647398"/>
       </p:ext>
     </p:extLst>
   </p:cSld>

</xml_diff>

<commit_message>
added support for Kluster grids in the GUI
</commit_message>
<xml_diff>
--- a/resources/icons.pptx
+++ b/resources/icons.pptx
@@ -5,33 +5,34 @@
     <p:sldMasterId id="2147483684" r:id="rId1"/>
   </p:sldMasterIdLst>
   <p:notesMasterIdLst>
-    <p:notesMasterId r:id="rId26"/>
+    <p:notesMasterId r:id="rId27"/>
   </p:notesMasterIdLst>
   <p:sldIdLst>
     <p:sldId id="388" r:id="rId2"/>
     <p:sldId id="574" r:id="rId3"/>
     <p:sldId id="575" r:id="rId4"/>
     <p:sldId id="587" r:id="rId5"/>
-    <p:sldId id="576" r:id="rId6"/>
-    <p:sldId id="595" r:id="rId7"/>
-    <p:sldId id="577" r:id="rId8"/>
-    <p:sldId id="578" r:id="rId9"/>
-    <p:sldId id="596" r:id="rId10"/>
-    <p:sldId id="579" r:id="rId11"/>
-    <p:sldId id="580" r:id="rId12"/>
-    <p:sldId id="581" r:id="rId13"/>
-    <p:sldId id="582" r:id="rId14"/>
-    <p:sldId id="583" r:id="rId15"/>
-    <p:sldId id="586" r:id="rId16"/>
-    <p:sldId id="584" r:id="rId17"/>
-    <p:sldId id="585" r:id="rId18"/>
-    <p:sldId id="588" r:id="rId19"/>
-    <p:sldId id="589" r:id="rId20"/>
-    <p:sldId id="590" r:id="rId21"/>
-    <p:sldId id="591" r:id="rId22"/>
-    <p:sldId id="592" r:id="rId23"/>
-    <p:sldId id="594" r:id="rId24"/>
-    <p:sldId id="593" r:id="rId25"/>
+    <p:sldId id="597" r:id="rId6"/>
+    <p:sldId id="576" r:id="rId7"/>
+    <p:sldId id="595" r:id="rId8"/>
+    <p:sldId id="577" r:id="rId9"/>
+    <p:sldId id="578" r:id="rId10"/>
+    <p:sldId id="596" r:id="rId11"/>
+    <p:sldId id="579" r:id="rId12"/>
+    <p:sldId id="580" r:id="rId13"/>
+    <p:sldId id="581" r:id="rId14"/>
+    <p:sldId id="582" r:id="rId15"/>
+    <p:sldId id="583" r:id="rId16"/>
+    <p:sldId id="586" r:id="rId17"/>
+    <p:sldId id="584" r:id="rId18"/>
+    <p:sldId id="585" r:id="rId19"/>
+    <p:sldId id="588" r:id="rId20"/>
+    <p:sldId id="589" r:id="rId21"/>
+    <p:sldId id="590" r:id="rId22"/>
+    <p:sldId id="591" r:id="rId23"/>
+    <p:sldId id="592" r:id="rId24"/>
+    <p:sldId id="594" r:id="rId25"/>
+    <p:sldId id="593" r:id="rId26"/>
   </p:sldIdLst>
   <p:sldSz cx="914400" cy="914400"/>
   <p:notesSz cx="6858000" cy="9144000"/>
@@ -220,7 +221,7 @@
           <a:p>
             <a:fld id="{173FD435-C119-4590-9D53-7CAF83F19020}" type="datetimeFigureOut">
               <a:rPr lang="en-US" smtClean="0"/>
-              <a:t>1/2/2021</a:t>
+              <a:t>9/28/2021</a:t>
             </a:fld>
             <a:endParaRPr lang="en-US"/>
           </a:p>
@@ -618,7 +619,7 @@
           <a:p>
             <a:fld id="{D296FE55-24A0-4405-87BA-F203EB2AA989}" type="datetimeFigureOut">
               <a:rPr lang="en-US" smtClean="0"/>
-              <a:t>1/2/2021</a:t>
+              <a:t>9/28/2021</a:t>
             </a:fld>
             <a:endParaRPr lang="en-US"/>
           </a:p>
@@ -788,7 +789,7 @@
           <a:p>
             <a:fld id="{D296FE55-24A0-4405-87BA-F203EB2AA989}" type="datetimeFigureOut">
               <a:rPr lang="en-US" smtClean="0"/>
-              <a:t>1/2/2021</a:t>
+              <a:t>9/28/2021</a:t>
             </a:fld>
             <a:endParaRPr lang="en-US"/>
           </a:p>
@@ -968,7 +969,7 @@
           <a:p>
             <a:fld id="{D296FE55-24A0-4405-87BA-F203EB2AA989}" type="datetimeFigureOut">
               <a:rPr lang="en-US" smtClean="0"/>
-              <a:t>1/2/2021</a:t>
+              <a:t>9/28/2021</a:t>
             </a:fld>
             <a:endParaRPr lang="en-US"/>
           </a:p>
@@ -1138,7 +1139,7 @@
           <a:p>
             <a:fld id="{D296FE55-24A0-4405-87BA-F203EB2AA989}" type="datetimeFigureOut">
               <a:rPr lang="en-US" smtClean="0"/>
-              <a:t>1/2/2021</a:t>
+              <a:t>9/28/2021</a:t>
             </a:fld>
             <a:endParaRPr lang="en-US"/>
           </a:p>
@@ -1382,7 +1383,7 @@
           <a:p>
             <a:fld id="{D296FE55-24A0-4405-87BA-F203EB2AA989}" type="datetimeFigureOut">
               <a:rPr lang="en-US" smtClean="0"/>
-              <a:t>1/2/2021</a:t>
+              <a:t>9/28/2021</a:t>
             </a:fld>
             <a:endParaRPr lang="en-US"/>
           </a:p>
@@ -1614,7 +1615,7 @@
           <a:p>
             <a:fld id="{D296FE55-24A0-4405-87BA-F203EB2AA989}" type="datetimeFigureOut">
               <a:rPr lang="en-US" smtClean="0"/>
-              <a:t>1/2/2021</a:t>
+              <a:t>9/28/2021</a:t>
             </a:fld>
             <a:endParaRPr lang="en-US"/>
           </a:p>
@@ -1981,7 +1982,7 @@
           <a:p>
             <a:fld id="{D296FE55-24A0-4405-87BA-F203EB2AA989}" type="datetimeFigureOut">
               <a:rPr lang="en-US" smtClean="0"/>
-              <a:t>1/2/2021</a:t>
+              <a:t>9/28/2021</a:t>
             </a:fld>
             <a:endParaRPr lang="en-US"/>
           </a:p>
@@ -2099,7 +2100,7 @@
           <a:p>
             <a:fld id="{D296FE55-24A0-4405-87BA-F203EB2AA989}" type="datetimeFigureOut">
               <a:rPr lang="en-US" smtClean="0"/>
-              <a:t>1/2/2021</a:t>
+              <a:t>9/28/2021</a:t>
             </a:fld>
             <a:endParaRPr lang="en-US"/>
           </a:p>
@@ -2194,7 +2195,7 @@
           <a:p>
             <a:fld id="{D296FE55-24A0-4405-87BA-F203EB2AA989}" type="datetimeFigureOut">
               <a:rPr lang="en-US" smtClean="0"/>
-              <a:t>1/2/2021</a:t>
+              <a:t>9/28/2021</a:t>
             </a:fld>
             <a:endParaRPr lang="en-US"/>
           </a:p>
@@ -2471,7 +2472,7 @@
           <a:p>
             <a:fld id="{D296FE55-24A0-4405-87BA-F203EB2AA989}" type="datetimeFigureOut">
               <a:rPr lang="en-US" smtClean="0"/>
-              <a:t>1/2/2021</a:t>
+              <a:t>9/28/2021</a:t>
             </a:fld>
             <a:endParaRPr lang="en-US"/>
           </a:p>
@@ -2728,7 +2729,7 @@
           <a:p>
             <a:fld id="{D296FE55-24A0-4405-87BA-F203EB2AA989}" type="datetimeFigureOut">
               <a:rPr lang="en-US" smtClean="0"/>
-              <a:t>1/2/2021</a:t>
+              <a:t>9/28/2021</a:t>
             </a:fld>
             <a:endParaRPr lang="en-US"/>
           </a:p>
@@ -2941,7 +2942,7 @@
           <a:p>
             <a:fld id="{D296FE55-24A0-4405-87BA-F203EB2AA989}" type="datetimeFigureOut">
               <a:rPr lang="en-US" smtClean="0"/>
-              <a:t>1/2/2021</a:t>
+              <a:t>9/28/2021</a:t>
             </a:fld>
             <a:endParaRPr lang="en-US"/>
           </a:p>
@@ -3467,6 +3468,295 @@
           <a:chExt cx="0" cy="0"/>
         </a:xfrm>
       </p:grpSpPr>
+      <p:sp>
+        <p:nvSpPr>
+          <p:cNvPr id="3" name="TextBox 2">
+            <a:extLst>
+              <a:ext uri="{FF2B5EF4-FFF2-40B4-BE49-F238E27FC236}">
+                <a16:creationId xmlns:a16="http://schemas.microsoft.com/office/drawing/2014/main" id="{F7E09E6A-3B7C-45F4-95DB-63FBA56CDB62}"/>
+              </a:ext>
+            </a:extLst>
+          </p:cNvPr>
+          <p:cNvSpPr txBox="1"/>
+          <p:nvPr/>
+        </p:nvSpPr>
+        <p:spPr>
+          <a:xfrm>
+            <a:off x="0" y="2381"/>
+            <a:ext cx="1054896" cy="1007776"/>
+          </a:xfrm>
+          <a:prstGeom prst="rect">
+            <a:avLst/>
+          </a:prstGeom>
+          <a:noFill/>
+          <a:effectLst/>
+        </p:spPr>
+        <p:txBody>
+          <a:bodyPr wrap="square" rtlCol="0">
+            <a:spAutoFit/>
+            <a:scene3d>
+              <a:camera prst="orthographicFront"/>
+              <a:lightRig rig="soft" dir="t">
+                <a:rot lat="0" lon="0" rev="16200000"/>
+              </a:lightRig>
+            </a:scene3d>
+            <a:sp3d extrusionH="63500" prstMaterial="softEdge"/>
+          </a:bodyPr>
+          <a:lstStyle/>
+          <a:p>
+            <a:pPr>
+              <a:lnSpc>
+                <a:spcPct val="70000"/>
+              </a:lnSpc>
+            </a:pPr>
+            <a:r>
+              <a:rPr lang="en-US" sz="2800" dirty="0">
+                <a:ln/>
+                <a:solidFill>
+                  <a:schemeClr val="accent1">
+                    <a:lumMod val="75000"/>
+                  </a:schemeClr>
+                </a:solidFill>
+                <a:latin typeface="Cooper Black" panose="0208090404030B020404" pitchFamily="18" charset="0"/>
+                <a:cs typeface="Gautami" panose="020B0502040204020203" pitchFamily="34" charset="0"/>
+              </a:rPr>
+              <a:t>B </a:t>
+            </a:r>
+          </a:p>
+          <a:p>
+            <a:pPr>
+              <a:lnSpc>
+                <a:spcPct val="70000"/>
+              </a:lnSpc>
+            </a:pPr>
+            <a:r>
+              <a:rPr lang="en-US" sz="2800" dirty="0">
+                <a:ln/>
+                <a:solidFill>
+                  <a:schemeClr val="accent1">
+                    <a:lumMod val="75000"/>
+                  </a:schemeClr>
+                </a:solidFill>
+                <a:latin typeface="Cooper Black" panose="0208090404030B020404" pitchFamily="18" charset="0"/>
+                <a:cs typeface="Gautami" panose="020B0502040204020203" pitchFamily="34" charset="0"/>
+              </a:rPr>
+              <a:t>A</a:t>
+            </a:r>
+          </a:p>
+          <a:p>
+            <a:pPr>
+              <a:lnSpc>
+                <a:spcPct val="70000"/>
+              </a:lnSpc>
+            </a:pPr>
+            <a:r>
+              <a:rPr lang="en-US" sz="2800" dirty="0">
+                <a:ln/>
+                <a:solidFill>
+                  <a:schemeClr val="accent1">
+                    <a:lumMod val="75000"/>
+                  </a:schemeClr>
+                </a:solidFill>
+                <a:latin typeface="Cooper Black" panose="0208090404030B020404" pitchFamily="18" charset="0"/>
+                <a:cs typeface="Gautami" panose="020B0502040204020203" pitchFamily="34" charset="0"/>
+              </a:rPr>
+              <a:t>G</a:t>
+            </a:r>
+          </a:p>
+        </p:txBody>
+      </p:sp>
+      <p:sp>
+        <p:nvSpPr>
+          <p:cNvPr id="18" name="TextBox 17">
+            <a:extLst>
+              <a:ext uri="{FF2B5EF4-FFF2-40B4-BE49-F238E27FC236}">
+                <a16:creationId xmlns:a16="http://schemas.microsoft.com/office/drawing/2014/main" id="{8F4E1C3B-E8CE-4613-B2ED-340AD417FF68}"/>
+              </a:ext>
+            </a:extLst>
+          </p:cNvPr>
+          <p:cNvSpPr txBox="1"/>
+          <p:nvPr/>
+        </p:nvSpPr>
+        <p:spPr>
+          <a:xfrm>
+            <a:off x="388147" y="-28749"/>
+            <a:ext cx="385347" cy="923330"/>
+          </a:xfrm>
+          <a:prstGeom prst="rect">
+            <a:avLst/>
+          </a:prstGeom>
+          <a:noFill/>
+          <a:ln>
+            <a:noFill/>
+          </a:ln>
+        </p:spPr>
+        <p:txBody>
+          <a:bodyPr wrap="square" rtlCol="0">
+            <a:spAutoFit/>
+            <a:scene3d>
+              <a:camera prst="orthographicFront"/>
+              <a:lightRig rig="threePt" dir="t"/>
+            </a:scene3d>
+            <a:sp3d extrusionH="31750">
+              <a:bevelT w="25400" h="25400" prst="angle"/>
+            </a:sp3d>
+          </a:bodyPr>
+          <a:lstStyle/>
+          <a:p>
+            <a:r>
+              <a:rPr lang="en-US" dirty="0">
+                <a:gradFill flip="none" rotWithShape="1">
+                  <a:gsLst>
+                    <a:gs pos="0">
+                      <a:schemeClr val="accent6">
+                        <a:lumMod val="85000"/>
+                      </a:schemeClr>
+                    </a:gs>
+                    <a:gs pos="23000">
+                      <a:schemeClr val="accent6">
+                        <a:lumMod val="80000"/>
+                      </a:schemeClr>
+                    </a:gs>
+                    <a:gs pos="69000">
+                      <a:schemeClr val="accent6">
+                        <a:lumMod val="65000"/>
+                      </a:schemeClr>
+                    </a:gs>
+                    <a:gs pos="97000">
+                      <a:schemeClr val="accent6">
+                        <a:lumMod val="50000"/>
+                      </a:schemeClr>
+                    </a:gs>
+                  </a:gsLst>
+                  <a:path path="circle">
+                    <a:fillToRect l="50000" t="50000" r="50000" b="50000"/>
+                  </a:path>
+                  <a:tileRect/>
+                </a:gradFill>
+                <a:effectLst>
+                  <a:outerShdw blurRad="12700" dist="12700" dir="2700000" algn="tl" rotWithShape="0">
+                    <a:prstClr val="black">
+                      <a:alpha val="40000"/>
+                    </a:prstClr>
+                  </a:outerShdw>
+                </a:effectLst>
+              </a:rPr>
+              <a:t>✔    ✔ ✔</a:t>
+            </a:r>
+          </a:p>
+        </p:txBody>
+      </p:sp>
+      <p:sp>
+        <p:nvSpPr>
+          <p:cNvPr id="21" name="TextBox 20">
+            <a:extLst>
+              <a:ext uri="{FF2B5EF4-FFF2-40B4-BE49-F238E27FC236}">
+                <a16:creationId xmlns:a16="http://schemas.microsoft.com/office/drawing/2014/main" id="{8F4E1C3B-E8CE-4613-B2ED-340AD417FF68}"/>
+              </a:ext>
+            </a:extLst>
+          </p:cNvPr>
+          <p:cNvSpPr txBox="1"/>
+          <p:nvPr/>
+        </p:nvSpPr>
+        <p:spPr>
+          <a:xfrm>
+            <a:off x="580820" y="19695"/>
+            <a:ext cx="385347" cy="923330"/>
+          </a:xfrm>
+          <a:prstGeom prst="rect">
+            <a:avLst/>
+          </a:prstGeom>
+          <a:noFill/>
+          <a:ln>
+            <a:noFill/>
+          </a:ln>
+        </p:spPr>
+        <p:txBody>
+          <a:bodyPr wrap="square" rtlCol="0">
+            <a:spAutoFit/>
+            <a:scene3d>
+              <a:camera prst="orthographicFront"/>
+              <a:lightRig rig="threePt" dir="t"/>
+            </a:scene3d>
+            <a:sp3d extrusionH="31750">
+              <a:bevelT w="25400" h="25400" prst="angle"/>
+            </a:sp3d>
+          </a:bodyPr>
+          <a:lstStyle/>
+          <a:p>
+            <a:r>
+              <a:rPr lang="en-US" dirty="0">
+                <a:gradFill flip="none" rotWithShape="1">
+                  <a:gsLst>
+                    <a:gs pos="0">
+                      <a:schemeClr val="accent6">
+                        <a:lumMod val="85000"/>
+                      </a:schemeClr>
+                    </a:gs>
+                    <a:gs pos="23000">
+                      <a:schemeClr val="accent6">
+                        <a:lumMod val="80000"/>
+                      </a:schemeClr>
+                    </a:gs>
+                    <a:gs pos="69000">
+                      <a:schemeClr val="accent6">
+                        <a:lumMod val="65000"/>
+                      </a:schemeClr>
+                    </a:gs>
+                    <a:gs pos="97000">
+                      <a:schemeClr val="accent6">
+                        <a:lumMod val="50000"/>
+                      </a:schemeClr>
+                    </a:gs>
+                  </a:gsLst>
+                  <a:path path="circle">
+                    <a:fillToRect l="50000" t="50000" r="50000" b="50000"/>
+                  </a:path>
+                  <a:tileRect/>
+                </a:gradFill>
+                <a:effectLst>
+                  <a:outerShdw blurRad="12700" dist="12700" dir="2700000" algn="tl" rotWithShape="0">
+                    <a:prstClr val="black">
+                      <a:alpha val="40000"/>
+                    </a:prstClr>
+                  </a:outerShdw>
+                </a:effectLst>
+              </a:rPr>
+              <a:t>✔    ✔ ✔</a:t>
+            </a:r>
+          </a:p>
+        </p:txBody>
+      </p:sp>
+    </p:spTree>
+    <p:extLst>
+      <p:ext uri="{BB962C8B-B14F-4D97-AF65-F5344CB8AC3E}">
+        <p14:creationId xmlns:p14="http://schemas.microsoft.com/office/powerpoint/2010/main" val="4174647398"/>
+      </p:ext>
+    </p:extLst>
+  </p:cSld>
+  <p:clrMapOvr>
+    <a:masterClrMapping/>
+  </p:clrMapOvr>
+</p:sld>
+</file>
+
+<file path=ppt/slides/slide11.xml><?xml version="1.0" encoding="utf-8"?>
+<p:sld xmlns:a="http://schemas.openxmlformats.org/drawingml/2006/main" xmlns:r="http://schemas.openxmlformats.org/officeDocument/2006/relationships" xmlns:p="http://schemas.openxmlformats.org/presentationml/2006/main">
+  <p:cSld>
+    <p:spTree>
+      <p:nvGrpSpPr>
+        <p:cNvPr id="1" name=""/>
+        <p:cNvGrpSpPr/>
+        <p:nvPr/>
+      </p:nvGrpSpPr>
+      <p:grpSpPr>
+        <a:xfrm>
+          <a:off x="0" y="0"/>
+          <a:ext cx="0" cy="0"/>
+          <a:chOff x="0" y="0"/>
+          <a:chExt cx="0" cy="0"/>
+        </a:xfrm>
+      </p:grpSpPr>
       <p:pic>
         <p:nvPicPr>
           <p:cNvPr id="2" name="Picture 1">
@@ -3559,7 +3849,7 @@
 </p:sld>
 </file>
 
-<file path=ppt/slides/slide11.xml><?xml version="1.0" encoding="utf-8"?>
+<file path=ppt/slides/slide12.xml><?xml version="1.0" encoding="utf-8"?>
 <p:sld xmlns:a="http://schemas.openxmlformats.org/drawingml/2006/main" xmlns:r="http://schemas.openxmlformats.org/officeDocument/2006/relationships" xmlns:p="http://schemas.openxmlformats.org/presentationml/2006/main">
   <p:cSld>
     <p:spTree>
@@ -3655,7 +3945,7 @@
 </p:sld>
 </file>
 
-<file path=ppt/slides/slide12.xml><?xml version="1.0" encoding="utf-8"?>
+<file path=ppt/slides/slide13.xml><?xml version="1.0" encoding="utf-8"?>
 <p:sld xmlns:a="http://schemas.openxmlformats.org/drawingml/2006/main" xmlns:r="http://schemas.openxmlformats.org/officeDocument/2006/relationships" xmlns:p="http://schemas.openxmlformats.org/presentationml/2006/main">
   <p:cSld>
     <p:spTree>
@@ -9246,7 +9536,7 @@
 </p:sld>
 </file>
 
-<file path=ppt/slides/slide13.xml><?xml version="1.0" encoding="utf-8"?>
+<file path=ppt/slides/slide14.xml><?xml version="1.0" encoding="utf-8"?>
 <p:sld xmlns:a="http://schemas.openxmlformats.org/drawingml/2006/main" xmlns:r="http://schemas.openxmlformats.org/officeDocument/2006/relationships" xmlns:p="http://schemas.openxmlformats.org/presentationml/2006/main">
   <p:cSld>
     <p:spTree>
@@ -9419,7 +9709,7 @@
 </p:sld>
 </file>
 
-<file path=ppt/slides/slide14.xml><?xml version="1.0" encoding="utf-8"?>
+<file path=ppt/slides/slide15.xml><?xml version="1.0" encoding="utf-8"?>
 <p:sld xmlns:a="http://schemas.openxmlformats.org/drawingml/2006/main" xmlns:r="http://schemas.openxmlformats.org/officeDocument/2006/relationships" xmlns:p="http://schemas.openxmlformats.org/presentationml/2006/main">
   <p:cSld>
     <p:spTree>
@@ -9584,7 +9874,7 @@
 </p:sld>
 </file>
 
-<file path=ppt/slides/slide15.xml><?xml version="1.0" encoding="utf-8"?>
+<file path=ppt/slides/slide16.xml><?xml version="1.0" encoding="utf-8"?>
 <p:sld xmlns:a="http://schemas.openxmlformats.org/drawingml/2006/main" xmlns:r="http://schemas.openxmlformats.org/officeDocument/2006/relationships" xmlns:p="http://schemas.openxmlformats.org/presentationml/2006/main">
   <p:cSld>
     <p:spTree>
@@ -9614,7 +9904,7 @@
 </p:sld>
 </file>
 
-<file path=ppt/slides/slide16.xml><?xml version="1.0" encoding="utf-8"?>
+<file path=ppt/slides/slide17.xml><?xml version="1.0" encoding="utf-8"?>
 <p:sld xmlns:a="http://schemas.openxmlformats.org/drawingml/2006/main" xmlns:r="http://schemas.openxmlformats.org/officeDocument/2006/relationships" xmlns:p="http://schemas.openxmlformats.org/presentationml/2006/main">
   <p:cSld>
     <p:spTree>
@@ -9777,7 +10067,7 @@
 </p:sld>
 </file>
 
-<file path=ppt/slides/slide17.xml><?xml version="1.0" encoding="utf-8"?>
+<file path=ppt/slides/slide18.xml><?xml version="1.0" encoding="utf-8"?>
 <p:sld xmlns:a="http://schemas.openxmlformats.org/drawingml/2006/main" xmlns:r="http://schemas.openxmlformats.org/officeDocument/2006/relationships" xmlns:p="http://schemas.openxmlformats.org/presentationml/2006/main">
   <p:cSld>
     <p:spTree>
@@ -9885,7 +10175,7 @@
 </p:sld>
 </file>
 
-<file path=ppt/slides/slide18.xml><?xml version="1.0" encoding="utf-8"?>
+<file path=ppt/slides/slide19.xml><?xml version="1.0" encoding="utf-8"?>
 <p:sld xmlns:a="http://schemas.openxmlformats.org/drawingml/2006/main" xmlns:r="http://schemas.openxmlformats.org/officeDocument/2006/relationships" xmlns:p="http://schemas.openxmlformats.org/presentationml/2006/main">
   <p:cSld>
     <p:spTree>
@@ -10219,7 +10509,119 @@
 </p:sld>
 </file>
 
-<file path=ppt/slides/slide19.xml><?xml version="1.0" encoding="utf-8"?>
+<file path=ppt/slides/slide2.xml><?xml version="1.0" encoding="utf-8"?>
+<p:sld xmlns:a="http://schemas.openxmlformats.org/drawingml/2006/main" xmlns:r="http://schemas.openxmlformats.org/officeDocument/2006/relationships" xmlns:p="http://schemas.openxmlformats.org/presentationml/2006/main">
+  <p:cSld>
+    <p:spTree>
+      <p:nvGrpSpPr>
+        <p:cNvPr id="1" name=""/>
+        <p:cNvGrpSpPr/>
+        <p:nvPr/>
+      </p:nvGrpSpPr>
+      <p:grpSpPr>
+        <a:xfrm>
+          <a:off x="0" y="0"/>
+          <a:ext cx="0" cy="0"/>
+          <a:chOff x="0" y="0"/>
+          <a:chExt cx="0" cy="0"/>
+        </a:xfrm>
+      </p:grpSpPr>
+      <p:sp>
+        <p:nvSpPr>
+          <p:cNvPr id="4" name="Oval 3"/>
+          <p:cNvSpPr/>
+          <p:nvPr/>
+        </p:nvSpPr>
+        <p:spPr>
+          <a:xfrm>
+            <a:off x="100584" y="100584"/>
+            <a:ext cx="713232" cy="713232"/>
+          </a:xfrm>
+          <a:prstGeom prst="ellipse">
+            <a:avLst/>
+          </a:prstGeom>
+          <a:solidFill>
+            <a:schemeClr val="bg1">
+              <a:lumMod val="95000"/>
+            </a:schemeClr>
+          </a:solidFill>
+          <a:ln>
+            <a:noFill/>
+          </a:ln>
+          <a:effectLst>
+            <a:outerShdw dist="38100" dir="2700000" algn="tl" rotWithShape="0">
+              <a:prstClr val="black">
+                <a:alpha val="40000"/>
+              </a:prstClr>
+            </a:outerShdw>
+          </a:effectLst>
+          <a:scene3d>
+            <a:camera prst="orthographicFront"/>
+            <a:lightRig rig="harsh" dir="t"/>
+          </a:scene3d>
+          <a:sp3d>
+            <a:bevelT w="152400" h="50800" prst="softRound"/>
+          </a:sp3d>
+        </p:spPr>
+        <p:style>
+          <a:lnRef idx="2">
+            <a:schemeClr val="accent1">
+              <a:shade val="50000"/>
+            </a:schemeClr>
+          </a:lnRef>
+          <a:fillRef idx="1">
+            <a:schemeClr val="accent1"/>
+          </a:fillRef>
+          <a:effectRef idx="0">
+            <a:schemeClr val="accent1"/>
+          </a:effectRef>
+          <a:fontRef idx="minor">
+            <a:schemeClr val="lt1"/>
+          </a:fontRef>
+        </p:style>
+        <p:txBody>
+          <a:bodyPr rtlCol="0" anchor="ctr">
+            <a:sp3d extrusionH="57150" prstMaterial="matte">
+              <a:bevelT w="63500" h="12700" prst="coolSlant"/>
+              <a:contourClr>
+                <a:schemeClr val="bg1">
+                  <a:lumMod val="65000"/>
+                </a:schemeClr>
+              </a:contourClr>
+            </a:sp3d>
+          </a:bodyPr>
+          <a:lstStyle/>
+          <a:p>
+            <a:pPr algn="ctr"/>
+            <a:r>
+              <a:rPr lang="en-US" sz="5401" b="1" dirty="0">
+                <a:ln/>
+                <a:solidFill>
+                  <a:schemeClr val="accent1">
+                    <a:lumMod val="75000"/>
+                  </a:schemeClr>
+                </a:solidFill>
+                <a:latin typeface="Footlight MT Light" panose="0204060206030A020304" pitchFamily="18" charset="0"/>
+              </a:rPr>
+              <a:t>?</a:t>
+            </a:r>
+          </a:p>
+        </p:txBody>
+      </p:sp>
+    </p:spTree>
+    <p:extLst>
+      <p:ext uri="{BB962C8B-B14F-4D97-AF65-F5344CB8AC3E}">
+        <p14:creationId xmlns:p14="http://schemas.microsoft.com/office/powerpoint/2010/main" val="2702230131"/>
+      </p:ext>
+    </p:extLst>
+  </p:cSld>
+  <p:clrMapOvr>
+    <a:masterClrMapping/>
+  </p:clrMapOvr>
+</p:sld>
+</file>
+
+<file path=ppt/slides/slide20.xml><?xml version="1.0" encoding="utf-8"?>
 <p:sld xmlns:a="http://schemas.openxmlformats.org/drawingml/2006/main" xmlns:r="http://schemas.openxmlformats.org/officeDocument/2006/relationships" xmlns:p="http://schemas.openxmlformats.org/presentationml/2006/main">
   <p:cSld>
     <p:spTree>
@@ -10819,119 +11221,7 @@
 </p:sld>
 </file>
 
-<file path=ppt/slides/slide2.xml><?xml version="1.0" encoding="utf-8"?>
-<p:sld xmlns:a="http://schemas.openxmlformats.org/drawingml/2006/main" xmlns:r="http://schemas.openxmlformats.org/officeDocument/2006/relationships" xmlns:p="http://schemas.openxmlformats.org/presentationml/2006/main">
-  <p:cSld>
-    <p:spTree>
-      <p:nvGrpSpPr>
-        <p:cNvPr id="1" name=""/>
-        <p:cNvGrpSpPr/>
-        <p:nvPr/>
-      </p:nvGrpSpPr>
-      <p:grpSpPr>
-        <a:xfrm>
-          <a:off x="0" y="0"/>
-          <a:ext cx="0" cy="0"/>
-          <a:chOff x="0" y="0"/>
-          <a:chExt cx="0" cy="0"/>
-        </a:xfrm>
-      </p:grpSpPr>
-      <p:sp>
-        <p:nvSpPr>
-          <p:cNvPr id="4" name="Oval 3"/>
-          <p:cNvSpPr/>
-          <p:nvPr/>
-        </p:nvSpPr>
-        <p:spPr>
-          <a:xfrm>
-            <a:off x="100584" y="100584"/>
-            <a:ext cx="713232" cy="713232"/>
-          </a:xfrm>
-          <a:prstGeom prst="ellipse">
-            <a:avLst/>
-          </a:prstGeom>
-          <a:solidFill>
-            <a:schemeClr val="bg1">
-              <a:lumMod val="95000"/>
-            </a:schemeClr>
-          </a:solidFill>
-          <a:ln>
-            <a:noFill/>
-          </a:ln>
-          <a:effectLst>
-            <a:outerShdw dist="38100" dir="2700000" algn="tl" rotWithShape="0">
-              <a:prstClr val="black">
-                <a:alpha val="40000"/>
-              </a:prstClr>
-            </a:outerShdw>
-          </a:effectLst>
-          <a:scene3d>
-            <a:camera prst="orthographicFront"/>
-            <a:lightRig rig="harsh" dir="t"/>
-          </a:scene3d>
-          <a:sp3d>
-            <a:bevelT w="152400" h="50800" prst="softRound"/>
-          </a:sp3d>
-        </p:spPr>
-        <p:style>
-          <a:lnRef idx="2">
-            <a:schemeClr val="accent1">
-              <a:shade val="50000"/>
-            </a:schemeClr>
-          </a:lnRef>
-          <a:fillRef idx="1">
-            <a:schemeClr val="accent1"/>
-          </a:fillRef>
-          <a:effectRef idx="0">
-            <a:schemeClr val="accent1"/>
-          </a:effectRef>
-          <a:fontRef idx="minor">
-            <a:schemeClr val="lt1"/>
-          </a:fontRef>
-        </p:style>
-        <p:txBody>
-          <a:bodyPr rtlCol="0" anchor="ctr">
-            <a:sp3d extrusionH="57150" prstMaterial="matte">
-              <a:bevelT w="63500" h="12700" prst="coolSlant"/>
-              <a:contourClr>
-                <a:schemeClr val="bg1">
-                  <a:lumMod val="65000"/>
-                </a:schemeClr>
-              </a:contourClr>
-            </a:sp3d>
-          </a:bodyPr>
-          <a:lstStyle/>
-          <a:p>
-            <a:pPr algn="ctr"/>
-            <a:r>
-              <a:rPr lang="en-US" sz="5401" b="1" dirty="0">
-                <a:ln/>
-                <a:solidFill>
-                  <a:schemeClr val="accent1">
-                    <a:lumMod val="75000"/>
-                  </a:schemeClr>
-                </a:solidFill>
-                <a:latin typeface="Footlight MT Light" panose="0204060206030A020304" pitchFamily="18" charset="0"/>
-              </a:rPr>
-              <a:t>?</a:t>
-            </a:r>
-          </a:p>
-        </p:txBody>
-      </p:sp>
-    </p:spTree>
-    <p:extLst>
-      <p:ext uri="{BB962C8B-B14F-4D97-AF65-F5344CB8AC3E}">
-        <p14:creationId xmlns:p14="http://schemas.microsoft.com/office/powerpoint/2010/main" val="2702230131"/>
-      </p:ext>
-    </p:extLst>
-  </p:cSld>
-  <p:clrMapOvr>
-    <a:masterClrMapping/>
-  </p:clrMapOvr>
-</p:sld>
-</file>
-
-<file path=ppt/slides/slide20.xml><?xml version="1.0" encoding="utf-8"?>
+<file path=ppt/slides/slide21.xml><?xml version="1.0" encoding="utf-8"?>
 <p:sld xmlns:a="http://schemas.openxmlformats.org/drawingml/2006/main" xmlns:r="http://schemas.openxmlformats.org/officeDocument/2006/relationships" xmlns:p="http://schemas.openxmlformats.org/presentationml/2006/main">
   <p:cSld>
     <p:spTree>
@@ -10961,7 +11251,7 @@
 </p:sld>
 </file>
 
-<file path=ppt/slides/slide21.xml><?xml version="1.0" encoding="utf-8"?>
+<file path=ppt/slides/slide22.xml><?xml version="1.0" encoding="utf-8"?>
 <p:sld xmlns:a="http://schemas.openxmlformats.org/drawingml/2006/main" xmlns:r="http://schemas.openxmlformats.org/officeDocument/2006/relationships" xmlns:p="http://schemas.openxmlformats.org/presentationml/2006/main">
   <p:cSld>
     <p:spTree>
@@ -11734,7 +12024,7 @@
 </p:sld>
 </file>
 
-<file path=ppt/slides/slide22.xml><?xml version="1.0" encoding="utf-8"?>
+<file path=ppt/slides/slide23.xml><?xml version="1.0" encoding="utf-8"?>
 <p:sld xmlns:a="http://schemas.openxmlformats.org/drawingml/2006/main" xmlns:r="http://schemas.openxmlformats.org/officeDocument/2006/relationships" xmlns:p="http://schemas.openxmlformats.org/presentationml/2006/main">
   <p:cSld>
     <p:spTree>
@@ -11800,7 +12090,7 @@
 </p:sld>
 </file>
 
-<file path=ppt/slides/slide23.xml><?xml version="1.0" encoding="utf-8"?>
+<file path=ppt/slides/slide24.xml><?xml version="1.0" encoding="utf-8"?>
 <p:sld xmlns:a="http://schemas.openxmlformats.org/drawingml/2006/main" xmlns:r="http://schemas.openxmlformats.org/officeDocument/2006/relationships" xmlns:p="http://schemas.openxmlformats.org/presentationml/2006/main">
   <p:cSld>
     <p:spTree>
@@ -12991,7 +13281,7 @@
 </p:sld>
 </file>
 
-<file path=ppt/slides/slide24.xml><?xml version="1.0" encoding="utf-8"?>
+<file path=ppt/slides/slide25.xml><?xml version="1.0" encoding="utf-8"?>
 <p:sld xmlns:a="http://schemas.openxmlformats.org/drawingml/2006/main" xmlns:r="http://schemas.openxmlformats.org/officeDocument/2006/relationships" xmlns:p="http://schemas.openxmlformats.org/presentationml/2006/main">
   <p:cSld>
     <p:spTree>
@@ -13235,6 +13525,79 @@
           <a:chExt cx="0" cy="0"/>
         </a:xfrm>
       </p:grpSpPr>
+      <p:sp>
+        <p:nvSpPr>
+          <p:cNvPr id="2" name="Rectangle 1">
+            <a:extLst>
+              <a:ext uri="{FF2B5EF4-FFF2-40B4-BE49-F238E27FC236}">
+                <a16:creationId xmlns:a16="http://schemas.microsoft.com/office/drawing/2014/main" id="{6EE5FBD8-8EE8-4FB9-9BCD-66A32EE3B979}"/>
+              </a:ext>
+            </a:extLst>
+          </p:cNvPr>
+          <p:cNvSpPr/>
+          <p:nvPr/>
+        </p:nvSpPr>
+        <p:spPr>
+          <a:xfrm>
+            <a:off x="145255" y="-96798"/>
+            <a:ext cx="623890" cy="1107996"/>
+          </a:xfrm>
+          <a:prstGeom prst="rect">
+            <a:avLst/>
+          </a:prstGeom>
+          <a:noFill/>
+        </p:spPr>
+        <p:txBody>
+          <a:bodyPr wrap="none" lIns="91440" tIns="45720" rIns="91440" bIns="45720">
+            <a:spAutoFit/>
+          </a:bodyPr>
+          <a:lstStyle/>
+          <a:p>
+            <a:pPr algn="ctr"/>
+            <a:r>
+              <a:rPr lang="en-US" sz="6600" b="0" cap="none" spc="0" dirty="0">
+                <a:ln w="0"/>
+                <a:solidFill>
+                  <a:schemeClr val="accent1">
+                    <a:lumMod val="50000"/>
+                  </a:schemeClr>
+                </a:solidFill>
+              </a:rPr>
+              <a:t>K</a:t>
+            </a:r>
+          </a:p>
+        </p:txBody>
+      </p:sp>
+    </p:spTree>
+    <p:extLst>
+      <p:ext uri="{BB962C8B-B14F-4D97-AF65-F5344CB8AC3E}">
+        <p14:creationId xmlns:p14="http://schemas.microsoft.com/office/powerpoint/2010/main" val="1168678737"/>
+      </p:ext>
+    </p:extLst>
+  </p:cSld>
+  <p:clrMapOvr>
+    <a:masterClrMapping/>
+  </p:clrMapOvr>
+</p:sld>
+</file>
+
+<file path=ppt/slides/slide6.xml><?xml version="1.0" encoding="utf-8"?>
+<p:sld xmlns:a="http://schemas.openxmlformats.org/drawingml/2006/main" xmlns:r="http://schemas.openxmlformats.org/officeDocument/2006/relationships" xmlns:p="http://schemas.openxmlformats.org/presentationml/2006/main">
+  <p:cSld>
+    <p:spTree>
+      <p:nvGrpSpPr>
+        <p:cNvPr id="1" name=""/>
+        <p:cNvGrpSpPr/>
+        <p:nvPr/>
+      </p:nvGrpSpPr>
+      <p:grpSpPr>
+        <a:xfrm>
+          <a:off x="0" y="0"/>
+          <a:ext cx="0" cy="0"/>
+          <a:chOff x="0" y="0"/>
+          <a:chExt cx="0" cy="0"/>
+        </a:xfrm>
+      </p:grpSpPr>
       <p:grpSp>
         <p:nvGrpSpPr>
           <p:cNvPr id="2" name="Group 1">
@@ -13452,7 +13815,7 @@
 </p:sld>
 </file>
 
-<file path=ppt/slides/slide6.xml><?xml version="1.0" encoding="utf-8"?>
+<file path=ppt/slides/slide7.xml><?xml version="1.0" encoding="utf-8"?>
 <p:sld xmlns:a="http://schemas.openxmlformats.org/drawingml/2006/main" xmlns:r="http://schemas.openxmlformats.org/officeDocument/2006/relationships" xmlns:p="http://schemas.openxmlformats.org/presentationml/2006/main">
   <p:cSld>
     <p:spTree>
@@ -13843,7 +14206,7 @@
 </p:sld>
 </file>
 
-<file path=ppt/slides/slide7.xml><?xml version="1.0" encoding="utf-8"?>
+<file path=ppt/slides/slide8.xml><?xml version="1.0" encoding="utf-8"?>
 <p:sld xmlns:a="http://schemas.openxmlformats.org/drawingml/2006/main" xmlns:r="http://schemas.openxmlformats.org/officeDocument/2006/relationships" xmlns:p="http://schemas.openxmlformats.org/presentationml/2006/main">
   <p:cSld>
     <p:spTree>
@@ -19300,7 +19663,7 @@
 </p:sld>
 </file>
 
-<file path=ppt/slides/slide8.xml><?xml version="1.0" encoding="utf-8"?>
+<file path=ppt/slides/slide9.xml><?xml version="1.0" encoding="utf-8"?>
 <p:sld xmlns:a="http://schemas.openxmlformats.org/drawingml/2006/main" xmlns:r="http://schemas.openxmlformats.org/officeDocument/2006/relationships" xmlns:p="http://schemas.openxmlformats.org/presentationml/2006/main">
   <p:cSld>
     <p:spTree>
@@ -24673,305 +25036,6 @@
     <p:extLst>
       <p:ext uri="{BB962C8B-B14F-4D97-AF65-F5344CB8AC3E}">
         <p14:creationId xmlns:p14="http://schemas.microsoft.com/office/powerpoint/2010/main" val="195718788"/>
-      </p:ext>
-    </p:extLst>
-  </p:cSld>
-  <p:clrMapOvr>
-    <a:masterClrMapping/>
-  </p:clrMapOvr>
-</p:sld>
-</file>
-
-<file path=ppt/slides/slide9.xml><?xml version="1.0" encoding="utf-8"?>
-<p:sld xmlns:a="http://schemas.openxmlformats.org/drawingml/2006/main" xmlns:r="http://schemas.openxmlformats.org/officeDocument/2006/relationships" xmlns:p="http://schemas.openxmlformats.org/presentationml/2006/main">
-  <p:cSld>
-    <p:spTree>
-      <p:nvGrpSpPr>
-        <p:cNvPr id="1" name=""/>
-        <p:cNvGrpSpPr/>
-        <p:nvPr/>
-      </p:nvGrpSpPr>
-      <p:grpSpPr>
-        <a:xfrm>
-          <a:off x="0" y="0"/>
-          <a:ext cx="0" cy="0"/>
-          <a:chOff x="0" y="0"/>
-          <a:chExt cx="0" cy="0"/>
-        </a:xfrm>
-      </p:grpSpPr>
-      <p:sp>
-        <p:nvSpPr>
-          <p:cNvPr id="3" name="TextBox 2">
-            <a:extLst>
-              <a:ext uri="{FF2B5EF4-FFF2-40B4-BE49-F238E27FC236}">
-                <a16:creationId xmlns:a16="http://schemas.microsoft.com/office/drawing/2014/main" id="{F7E09E6A-3B7C-45F4-95DB-63FBA56CDB62}"/>
-              </a:ext>
-            </a:extLst>
-          </p:cNvPr>
-          <p:cNvSpPr txBox="1"/>
-          <p:nvPr/>
-        </p:nvSpPr>
-        <p:spPr>
-          <a:xfrm>
-            <a:off x="0" y="2381"/>
-            <a:ext cx="1054896" cy="1007776"/>
-          </a:xfrm>
-          <a:prstGeom prst="rect">
-            <a:avLst/>
-          </a:prstGeom>
-          <a:noFill/>
-          <a:effectLst/>
-        </p:spPr>
-        <p:txBody>
-          <a:bodyPr wrap="square" rtlCol="0">
-            <a:spAutoFit/>
-            <a:scene3d>
-              <a:camera prst="orthographicFront"/>
-              <a:lightRig rig="soft" dir="t">
-                <a:rot lat="0" lon="0" rev="16200000"/>
-              </a:lightRig>
-            </a:scene3d>
-            <a:sp3d extrusionH="63500" prstMaterial="softEdge"/>
-          </a:bodyPr>
-          <a:lstStyle/>
-          <a:p>
-            <a:pPr>
-              <a:lnSpc>
-                <a:spcPct val="70000"/>
-              </a:lnSpc>
-            </a:pPr>
-            <a:r>
-              <a:rPr lang="en-US" sz="2800" dirty="0" smtClean="0">
-                <a:ln/>
-                <a:solidFill>
-                  <a:schemeClr val="accent1">
-                    <a:lumMod val="75000"/>
-                  </a:schemeClr>
-                </a:solidFill>
-                <a:latin typeface="Cooper Black" panose="0208090404030B020404" pitchFamily="18" charset="0"/>
-                <a:cs typeface="Gautami" panose="020B0502040204020203" pitchFamily="34" charset="0"/>
-              </a:rPr>
-              <a:t>B </a:t>
-            </a:r>
-          </a:p>
-          <a:p>
-            <a:pPr>
-              <a:lnSpc>
-                <a:spcPct val="70000"/>
-              </a:lnSpc>
-            </a:pPr>
-            <a:r>
-              <a:rPr lang="en-US" sz="2800" dirty="0" smtClean="0">
-                <a:ln/>
-                <a:solidFill>
-                  <a:schemeClr val="accent1">
-                    <a:lumMod val="75000"/>
-                  </a:schemeClr>
-                </a:solidFill>
-                <a:latin typeface="Cooper Black" panose="0208090404030B020404" pitchFamily="18" charset="0"/>
-                <a:cs typeface="Gautami" panose="020B0502040204020203" pitchFamily="34" charset="0"/>
-              </a:rPr>
-              <a:t>A</a:t>
-            </a:r>
-          </a:p>
-          <a:p>
-            <a:pPr>
-              <a:lnSpc>
-                <a:spcPct val="70000"/>
-              </a:lnSpc>
-            </a:pPr>
-            <a:r>
-              <a:rPr lang="en-US" sz="2800" dirty="0" smtClean="0">
-                <a:ln/>
-                <a:solidFill>
-                  <a:schemeClr val="accent1">
-                    <a:lumMod val="75000"/>
-                  </a:schemeClr>
-                </a:solidFill>
-                <a:latin typeface="Cooper Black" panose="0208090404030B020404" pitchFamily="18" charset="0"/>
-                <a:cs typeface="Gautami" panose="020B0502040204020203" pitchFamily="34" charset="0"/>
-              </a:rPr>
-              <a:t>G</a:t>
-            </a:r>
-            <a:endParaRPr lang="en-US" sz="2800" dirty="0">
-              <a:ln/>
-              <a:solidFill>
-                <a:schemeClr val="accent1">
-                  <a:lumMod val="75000"/>
-                </a:schemeClr>
-              </a:solidFill>
-              <a:latin typeface="Cooper Black" panose="0208090404030B020404" pitchFamily="18" charset="0"/>
-              <a:cs typeface="Gautami" panose="020B0502040204020203" pitchFamily="34" charset="0"/>
-            </a:endParaRPr>
-          </a:p>
-        </p:txBody>
-      </p:sp>
-      <p:sp>
-        <p:nvSpPr>
-          <p:cNvPr id="18" name="TextBox 17">
-            <a:extLst>
-              <a:ext uri="{FF2B5EF4-FFF2-40B4-BE49-F238E27FC236}">
-                <a16:creationId xmlns:a16="http://schemas.microsoft.com/office/drawing/2014/main" id="{8F4E1C3B-E8CE-4613-B2ED-340AD417FF68}"/>
-              </a:ext>
-            </a:extLst>
-          </p:cNvPr>
-          <p:cNvSpPr txBox="1"/>
-          <p:nvPr/>
-        </p:nvSpPr>
-        <p:spPr>
-          <a:xfrm>
-            <a:off x="388147" y="-28749"/>
-            <a:ext cx="385347" cy="923330"/>
-          </a:xfrm>
-          <a:prstGeom prst="rect">
-            <a:avLst/>
-          </a:prstGeom>
-          <a:noFill/>
-          <a:ln>
-            <a:noFill/>
-          </a:ln>
-        </p:spPr>
-        <p:txBody>
-          <a:bodyPr wrap="square" rtlCol="0">
-            <a:spAutoFit/>
-            <a:scene3d>
-              <a:camera prst="orthographicFront"/>
-              <a:lightRig rig="threePt" dir="t"/>
-            </a:scene3d>
-            <a:sp3d extrusionH="31750">
-              <a:bevelT w="25400" h="25400" prst="angle"/>
-            </a:sp3d>
-          </a:bodyPr>
-          <a:lstStyle/>
-          <a:p>
-            <a:r>
-              <a:rPr lang="en-US" dirty="0" smtClean="0">
-                <a:gradFill flip="none" rotWithShape="1">
-                  <a:gsLst>
-                    <a:gs pos="0">
-                      <a:schemeClr val="accent6">
-                        <a:lumMod val="85000"/>
-                      </a:schemeClr>
-                    </a:gs>
-                    <a:gs pos="23000">
-                      <a:schemeClr val="accent6">
-                        <a:lumMod val="80000"/>
-                      </a:schemeClr>
-                    </a:gs>
-                    <a:gs pos="69000">
-                      <a:schemeClr val="accent6">
-                        <a:lumMod val="65000"/>
-                      </a:schemeClr>
-                    </a:gs>
-                    <a:gs pos="97000">
-                      <a:schemeClr val="accent6">
-                        <a:lumMod val="50000"/>
-                      </a:schemeClr>
-                    </a:gs>
-                  </a:gsLst>
-                  <a:path path="circle">
-                    <a:fillToRect l="50000" t="50000" r="50000" b="50000"/>
-                  </a:path>
-                  <a:tileRect/>
-                </a:gradFill>
-                <a:effectLst>
-                  <a:outerShdw blurRad="12700" dist="12700" dir="2700000" algn="tl" rotWithShape="0">
-                    <a:prstClr val="black">
-                      <a:alpha val="40000"/>
-                    </a:prstClr>
-                  </a:outerShdw>
-                </a:effectLst>
-              </a:rPr>
-              <a:t>✔    ✔ ✔</a:t>
-            </a:r>
-          </a:p>
-        </p:txBody>
-      </p:sp>
-      <p:sp>
-        <p:nvSpPr>
-          <p:cNvPr id="21" name="TextBox 20">
-            <a:extLst>
-              <a:ext uri="{FF2B5EF4-FFF2-40B4-BE49-F238E27FC236}">
-                <a16:creationId xmlns:a16="http://schemas.microsoft.com/office/drawing/2014/main" id="{8F4E1C3B-E8CE-4613-B2ED-340AD417FF68}"/>
-              </a:ext>
-            </a:extLst>
-          </p:cNvPr>
-          <p:cNvSpPr txBox="1"/>
-          <p:nvPr/>
-        </p:nvSpPr>
-        <p:spPr>
-          <a:xfrm>
-            <a:off x="580820" y="19695"/>
-            <a:ext cx="385347" cy="923330"/>
-          </a:xfrm>
-          <a:prstGeom prst="rect">
-            <a:avLst/>
-          </a:prstGeom>
-          <a:noFill/>
-          <a:ln>
-            <a:noFill/>
-          </a:ln>
-        </p:spPr>
-        <p:txBody>
-          <a:bodyPr wrap="square" rtlCol="0">
-            <a:spAutoFit/>
-            <a:scene3d>
-              <a:camera prst="orthographicFront"/>
-              <a:lightRig rig="threePt" dir="t"/>
-            </a:scene3d>
-            <a:sp3d extrusionH="31750">
-              <a:bevelT w="25400" h="25400" prst="angle"/>
-            </a:sp3d>
-          </a:bodyPr>
-          <a:lstStyle/>
-          <a:p>
-            <a:r>
-              <a:rPr lang="en-US" dirty="0" smtClean="0">
-                <a:gradFill flip="none" rotWithShape="1">
-                  <a:gsLst>
-                    <a:gs pos="0">
-                      <a:schemeClr val="accent6">
-                        <a:lumMod val="85000"/>
-                      </a:schemeClr>
-                    </a:gs>
-                    <a:gs pos="23000">
-                      <a:schemeClr val="accent6">
-                        <a:lumMod val="80000"/>
-                      </a:schemeClr>
-                    </a:gs>
-                    <a:gs pos="69000">
-                      <a:schemeClr val="accent6">
-                        <a:lumMod val="65000"/>
-                      </a:schemeClr>
-                    </a:gs>
-                    <a:gs pos="97000">
-                      <a:schemeClr val="accent6">
-                        <a:lumMod val="50000"/>
-                      </a:schemeClr>
-                    </a:gs>
-                  </a:gsLst>
-                  <a:path path="circle">
-                    <a:fillToRect l="50000" t="50000" r="50000" b="50000"/>
-                  </a:path>
-                  <a:tileRect/>
-                </a:gradFill>
-                <a:effectLst>
-                  <a:outerShdw blurRad="12700" dist="12700" dir="2700000" algn="tl" rotWithShape="0">
-                    <a:prstClr val="black">
-                      <a:alpha val="40000"/>
-                    </a:prstClr>
-                  </a:outerShdw>
-                </a:effectLst>
-              </a:rPr>
-              <a:t>✔    ✔ ✔</a:t>
-            </a:r>
-          </a:p>
-        </p:txBody>
-      </p:sp>
-    </p:spTree>
-    <p:extLst>
-      <p:ext uri="{BB962C8B-B14F-4D97-AF65-F5344CB8AC3E}">
-        <p14:creationId xmlns:p14="http://schemas.microsoft.com/office/powerpoint/2010/main" val="4174647398"/>
       </p:ext>
     </p:extLst>
   </p:cSld>

</xml_diff>